<commit_message>
banners: looking good now :-)
</commit_message>
<xml_diff>
--- a/screenshots/sortatime banner.pptx
+++ b/screenshots/sortatime banner.pptx
@@ -4388,8 +4388,8 @@
         </p:nvSpPr>
         <p:spPr>
           <a:xfrm>
-            <a:off x="3896174" y="1903676"/>
-            <a:ext cx="1351652" cy="369332"/>
+            <a:off x="3190852" y="1221035"/>
+            <a:ext cx="2762295" cy="1200329"/>
           </a:xfrm>
           <a:prstGeom prst="rect">
             <a:avLst/>
@@ -4402,14 +4402,15 @@
           </a:bodyPr>
           <a:lstStyle/>
           <a:p>
-            <a:r>
-              <a:rPr lang="en-US" dirty="0" err="1" smtClean="0">
+            <a:pPr algn="ctr"/>
+            <a:r>
+              <a:rPr lang="en-US" sz="7200" dirty="0" err="1" smtClean="0">
                 <a:latin typeface="Handwriting - Dakota"/>
                 <a:cs typeface="Handwriting - Dakota"/>
               </a:rPr>
-              <a:t>SortaTime</a:t>
-            </a:r>
-            <a:endParaRPr lang="en-US" dirty="0">
+              <a:t>Sorta</a:t>
+            </a:r>
+            <a:endParaRPr lang="en-US" sz="7200" dirty="0">
               <a:latin typeface="Handwriting - Dakota"/>
               <a:cs typeface="Handwriting - Dakota"/>
             </a:endParaRPr>

</xml_diff>